<commit_message>
Jeg kan ikke finde på mere
</commit_message>
<xml_diff>
--- a/midtvejsPraes.pptx
+++ b/midtvejsPraes.pptx
@@ -5,10 +5,10 @@
     <p:sldMasterId id="2147483662" r:id="rId1"/>
   </p:sldMasterIdLst>
   <p:notesMasterIdLst>
-    <p:notesMasterId r:id="rId11"/>
+    <p:notesMasterId r:id="rId12"/>
   </p:notesMasterIdLst>
   <p:handoutMasterIdLst>
-    <p:handoutMasterId r:id="rId12"/>
+    <p:handoutMasterId r:id="rId13"/>
   </p:handoutMasterIdLst>
   <p:sldIdLst>
     <p:sldId id="256" r:id="rId2"/>
@@ -20,11 +20,12 @@
     <p:sldId id="258" r:id="rId8"/>
     <p:sldId id="259" r:id="rId9"/>
     <p:sldId id="264" r:id="rId10"/>
+    <p:sldId id="265" r:id="rId11"/>
   </p:sldIdLst>
   <p:sldSz cx="9144000" cy="6858000" type="screen4x3"/>
   <p:notesSz cx="6858000" cy="9144000"/>
   <p:custDataLst>
-    <p:tags r:id="rId13"/>
+    <p:tags r:id="rId14"/>
   </p:custDataLst>
   <p:defaultTextStyle>
     <a:defPPr>
@@ -1840,7 +1841,10 @@
             </a:lvl1pPr>
           </a:lstStyle>
           <a:p>
-            <a:endParaRPr lang="da-DK"/>
+            <a:r>
+              <a:rPr lang="da-DK"/>
+              <a:t>Fagprojekt - Motorstyring på økobilen</a:t>
+            </a:r>
           </a:p>
         </p:txBody>
       </p:sp>
@@ -2258,9 +2262,10 @@
           </a:lstStyle>
           <a:p>
             <a:r>
-              <a:rPr lang="da-DK" dirty="0"/>
-              <a:t>29. april 2018</a:t>
-            </a:r>
+              <a:rPr lang="da-DK"/>
+              <a:t>8. maj 2018</a:t>
+            </a:r>
+            <a:endParaRPr lang="da-DK" dirty="0"/>
           </a:p>
         </p:txBody>
       </p:sp>
@@ -2546,9 +2551,10 @@
           <a:lstStyle/>
           <a:p>
             <a:r>
-              <a:rPr lang="da-DK" dirty="0"/>
-              <a:t>29. april 2018</a:t>
-            </a:r>
+              <a:rPr lang="da-DK"/>
+              <a:t>8. maj 2018</a:t>
+            </a:r>
+            <a:endParaRPr lang="da-DK" dirty="0"/>
           </a:p>
         </p:txBody>
       </p:sp>
@@ -2666,9 +2672,10 @@
           <a:lstStyle/>
           <a:p>
             <a:r>
-              <a:rPr lang="da-DK" dirty="0"/>
-              <a:t>29. april 2018</a:t>
-            </a:r>
+              <a:rPr lang="da-DK"/>
+              <a:t>8. maj 2018</a:t>
+            </a:r>
+            <a:endParaRPr lang="da-DK" dirty="0"/>
           </a:p>
         </p:txBody>
       </p:sp>
@@ -2764,9 +2771,10 @@
           <a:lstStyle/>
           <a:p>
             <a:r>
-              <a:rPr lang="da-DK" dirty="0"/>
-              <a:t>29. april 2018</a:t>
-            </a:r>
+              <a:rPr lang="da-DK"/>
+              <a:t>8. maj 2018</a:t>
+            </a:r>
+            <a:endParaRPr lang="da-DK" dirty="0"/>
           </a:p>
         </p:txBody>
       </p:sp>
@@ -2886,9 +2894,10 @@
           </a:lstStyle>
           <a:p>
             <a:r>
-              <a:rPr lang="da-DK" dirty="0"/>
-              <a:t>29. april 2018</a:t>
-            </a:r>
+              <a:rPr lang="da-DK"/>
+              <a:t>8. maj 2018</a:t>
+            </a:r>
+            <a:endParaRPr lang="da-DK" dirty="0"/>
           </a:p>
         </p:txBody>
       </p:sp>
@@ -3818,6 +3827,190 @@
 </p:sld>
 </file>
 
+<file path=ppt/slides/slide10.xml><?xml version="1.0" encoding="utf-8"?>
+<p:sld xmlns:a="http://schemas.openxmlformats.org/drawingml/2006/main" xmlns:r="http://schemas.openxmlformats.org/officeDocument/2006/relationships" xmlns:p="http://schemas.openxmlformats.org/presentationml/2006/main">
+  <p:cSld>
+    <p:spTree>
+      <p:nvGrpSpPr>
+        <p:cNvPr id="1" name=""/>
+        <p:cNvGrpSpPr/>
+        <p:nvPr/>
+      </p:nvGrpSpPr>
+      <p:grpSpPr>
+        <a:xfrm>
+          <a:off x="0" y="0"/>
+          <a:ext cx="0" cy="0"/>
+          <a:chOff x="0" y="0"/>
+          <a:chExt cx="0" cy="0"/>
+        </a:xfrm>
+      </p:grpSpPr>
+      <p:sp>
+        <p:nvSpPr>
+          <p:cNvPr id="2" name="Titel 1">
+            <a:extLst>
+              <a:ext uri="{FF2B5EF4-FFF2-40B4-BE49-F238E27FC236}">
+                <a16:creationId xmlns:a16="http://schemas.microsoft.com/office/drawing/2014/main" id="{E06C58D0-0F5D-4B2C-AD04-6F33C35FDF9C}"/>
+              </a:ext>
+            </a:extLst>
+          </p:cNvPr>
+          <p:cNvSpPr>
+            <a:spLocks noGrp="1"/>
+          </p:cNvSpPr>
+          <p:nvPr>
+            <p:ph type="title"/>
+          </p:nvPr>
+        </p:nvSpPr>
+        <p:spPr/>
+        <p:txBody>
+          <a:bodyPr/>
+          <a:lstStyle/>
+          <a:p>
+            <a:r>
+              <a:rPr lang="da-DK" sz="6000" dirty="0"/>
+              <a:t>Q &amp; A</a:t>
+            </a:r>
+          </a:p>
+        </p:txBody>
+      </p:sp>
+      <p:pic>
+        <p:nvPicPr>
+          <p:cNvPr id="8" name="Pladsholder til indhold 7">
+            <a:extLst>
+              <a:ext uri="{FF2B5EF4-FFF2-40B4-BE49-F238E27FC236}">
+                <a16:creationId xmlns:a16="http://schemas.microsoft.com/office/drawing/2014/main" id="{DCD9E867-7858-4726-9829-A68D8ED2CEAD}"/>
+              </a:ext>
+            </a:extLst>
+          </p:cNvPr>
+          <p:cNvPicPr>
+            <a:picLocks noGrp="1" noChangeAspect="1"/>
+          </p:cNvPicPr>
+          <p:nvPr>
+            <p:ph idx="1"/>
+          </p:nvPr>
+        </p:nvPicPr>
+        <p:blipFill>
+          <a:blip r:embed="rId2">
+            <a:extLst>
+              <a:ext uri="{28A0092B-C50C-407E-A947-70E740481C1C}">
+                <a14:useLocalDpi xmlns:a14="http://schemas.microsoft.com/office/drawing/2010/main" val="0"/>
+              </a:ext>
+              <a:ext uri="{837473B0-CC2E-450A-ABE3-18F120FF3D39}">
+                <a1611:picAttrSrcUrl xmlns:a1611="http://schemas.microsoft.com/office/drawing/2016/11/main" r:id="rId3"/>
+              </a:ext>
+            </a:extLst>
+          </a:blip>
+          <a:stretch>
+            <a:fillRect/>
+          </a:stretch>
+        </p:blipFill>
+        <p:spPr>
+          <a:xfrm>
+            <a:off x="2267744" y="1807540"/>
+            <a:ext cx="5320228" cy="4309719"/>
+          </a:xfrm>
+        </p:spPr>
+      </p:pic>
+      <p:sp>
+        <p:nvSpPr>
+          <p:cNvPr id="4" name="Pladsholder til dato 3">
+            <a:extLst>
+              <a:ext uri="{FF2B5EF4-FFF2-40B4-BE49-F238E27FC236}">
+                <a16:creationId xmlns:a16="http://schemas.microsoft.com/office/drawing/2014/main" id="{40D08B0C-6EC0-48E6-A123-B97C4EABD19E}"/>
+              </a:ext>
+            </a:extLst>
+          </p:cNvPr>
+          <p:cNvSpPr>
+            <a:spLocks noGrp="1"/>
+          </p:cNvSpPr>
+          <p:nvPr>
+            <p:ph type="dt" sz="half" idx="10"/>
+          </p:nvPr>
+        </p:nvSpPr>
+        <p:spPr/>
+        <p:txBody>
+          <a:bodyPr/>
+          <a:lstStyle/>
+          <a:p>
+            <a:r>
+              <a:rPr lang="da-DK"/>
+              <a:t>8. maj 2018</a:t>
+            </a:r>
+            <a:endParaRPr lang="da-DK" dirty="0"/>
+          </a:p>
+        </p:txBody>
+      </p:sp>
+      <p:sp>
+        <p:nvSpPr>
+          <p:cNvPr id="5" name="Pladsholder til sidefod 4">
+            <a:extLst>
+              <a:ext uri="{FF2B5EF4-FFF2-40B4-BE49-F238E27FC236}">
+                <a16:creationId xmlns:a16="http://schemas.microsoft.com/office/drawing/2014/main" id="{07545EBF-E532-41C0-85DE-365ABF813DE5}"/>
+              </a:ext>
+            </a:extLst>
+          </p:cNvPr>
+          <p:cNvSpPr>
+            <a:spLocks noGrp="1"/>
+          </p:cNvSpPr>
+          <p:nvPr>
+            <p:ph type="ftr" sz="quarter" idx="11"/>
+          </p:nvPr>
+        </p:nvSpPr>
+        <p:spPr/>
+        <p:txBody>
+          <a:bodyPr/>
+          <a:lstStyle/>
+          <a:p>
+            <a:r>
+              <a:rPr lang="da-DK"/>
+              <a:t>Fagprojekt - Motorstyring på økobilen</a:t>
+            </a:r>
+            <a:endParaRPr lang="da-DK" dirty="0"/>
+          </a:p>
+        </p:txBody>
+      </p:sp>
+      <p:sp>
+        <p:nvSpPr>
+          <p:cNvPr id="6" name="Pladsholder til slidenummer 5">
+            <a:extLst>
+              <a:ext uri="{FF2B5EF4-FFF2-40B4-BE49-F238E27FC236}">
+                <a16:creationId xmlns:a16="http://schemas.microsoft.com/office/drawing/2014/main" id="{E6923CE4-76F9-424D-9358-30FE94AF62C4}"/>
+              </a:ext>
+            </a:extLst>
+          </p:cNvPr>
+          <p:cNvSpPr>
+            <a:spLocks noGrp="1"/>
+          </p:cNvSpPr>
+          <p:nvPr>
+            <p:ph type="sldNum" sz="quarter" idx="12"/>
+          </p:nvPr>
+        </p:nvSpPr>
+        <p:spPr/>
+        <p:txBody>
+          <a:bodyPr/>
+          <a:lstStyle/>
+          <a:p>
+            <a:fld id="{103EA872-A674-449B-A120-B97244F8E91D}" type="slidenum">
+              <a:rPr lang="da-DK" smtClean="0"/>
+              <a:pPr/>
+              <a:t>10</a:t>
+            </a:fld>
+            <a:endParaRPr lang="da-DK" dirty="0"/>
+          </a:p>
+        </p:txBody>
+      </p:sp>
+    </p:spTree>
+    <p:extLst>
+      <p:ext uri="{BB962C8B-B14F-4D97-AF65-F5344CB8AC3E}">
+        <p14:creationId xmlns:p14="http://schemas.microsoft.com/office/powerpoint/2010/main" val="3783767545"/>
+      </p:ext>
+    </p:extLst>
+  </p:cSld>
+  <p:clrMapOvr>
+    <a:masterClrMapping/>
+  </p:clrMapOvr>
+</p:sld>
+</file>
+
 <file path=ppt/slides/slide2.xml><?xml version="1.0" encoding="utf-8"?>
 <p:sld xmlns:a="http://schemas.openxmlformats.org/drawingml/2006/main" xmlns:r="http://schemas.openxmlformats.org/officeDocument/2006/relationships" xmlns:p="http://schemas.openxmlformats.org/presentationml/2006/main">
   <p:cSld>
@@ -3863,31 +4056,41 @@
           </a:p>
         </p:txBody>
       </p:sp>
-      <p:sp>
-        <p:nvSpPr>
-          <p:cNvPr id="3" name="Pladsholder til indhold 2">
+      <p:pic>
+        <p:nvPicPr>
+          <p:cNvPr id="8" name="Pladsholder til indhold 7">
             <a:extLst>
               <a:ext uri="{FF2B5EF4-FFF2-40B4-BE49-F238E27FC236}">
-                <a16:creationId xmlns:a16="http://schemas.microsoft.com/office/drawing/2014/main" id="{602FEF17-9607-4C64-AB9C-EA0572FB1FBF}"/>
+                <a16:creationId xmlns:a16="http://schemas.microsoft.com/office/drawing/2014/main" id="{BBA2212F-981C-4BC2-9EFB-AC33966E6D9C}"/>
               </a:ext>
             </a:extLst>
           </p:cNvPr>
-          <p:cNvSpPr>
-            <a:spLocks noGrp="1"/>
-          </p:cNvSpPr>
+          <p:cNvPicPr>
+            <a:picLocks noGrp="1" noChangeAspect="1"/>
+          </p:cNvPicPr>
           <p:nvPr>
             <p:ph idx="1"/>
           </p:nvPr>
-        </p:nvSpPr>
-        <p:spPr/>
-        <p:txBody>
-          <a:bodyPr/>
-          <a:lstStyle/>
-          <a:p>
-            <a:endParaRPr lang="da-DK" dirty="0"/>
-          </a:p>
-        </p:txBody>
-      </p:sp>
+        </p:nvPicPr>
+        <p:blipFill>
+          <a:blip r:embed="rId3">
+            <a:extLst>
+              <a:ext uri="{28A0092B-C50C-407E-A947-70E740481C1C}">
+                <a14:useLocalDpi xmlns:a14="http://schemas.microsoft.com/office/drawing/2010/main" val="0"/>
+              </a:ext>
+            </a:extLst>
+          </a:blip>
+          <a:stretch>
+            <a:fillRect/>
+          </a:stretch>
+        </p:blipFill>
+        <p:spPr>
+          <a:xfrm>
+            <a:off x="1452033" y="1600200"/>
+            <a:ext cx="6087533" cy="4565650"/>
+          </a:xfrm>
+        </p:spPr>
+      </p:pic>
       <p:sp>
         <p:nvSpPr>
           <p:cNvPr id="4" name="Pladsholder til dato 3">
@@ -3911,7 +4114,7 @@
           <a:p>
             <a:r>
               <a:rPr lang="da-DK"/>
-              <a:t>29. april 2018</a:t>
+              <a:t>8. maj 2018</a:t>
             </a:r>
             <a:endParaRPr lang="da-DK" dirty="0"/>
           </a:p>
@@ -4137,7 +4340,7 @@
           <a:p>
             <a:r>
               <a:rPr lang="da-DK"/>
-              <a:t>29. april 2018</a:t>
+              <a:t>8. maj 2018</a:t>
             </a:r>
             <a:endParaRPr lang="da-DK" dirty="0"/>
           </a:p>
@@ -4271,13 +4474,13 @@
           <a:p>
             <a:r>
               <a:rPr lang="da-DK" dirty="0"/>
+              <a:t>Overtagelse af et projekt</a:t>
+            </a:r>
+          </a:p>
+          <a:p>
+            <a:r>
+              <a:rPr lang="da-DK" dirty="0"/>
               <a:t>Samarbejde med andre linjer</a:t>
-            </a:r>
-          </a:p>
-          <a:p>
-            <a:r>
-              <a:rPr lang="da-DK" dirty="0"/>
-              <a:t>Styring af brændstofs mængde</a:t>
             </a:r>
           </a:p>
           <a:p>
@@ -4287,7 +4490,24 @@
             </a:r>
           </a:p>
           <a:p>
-            <a:endParaRPr lang="da-DK" dirty="0"/>
+            <a:r>
+              <a:rPr lang="da-DK" dirty="0"/>
+              <a:t>Teknologiske udfordringer</a:t>
+            </a:r>
+          </a:p>
+          <a:p>
+            <a:pPr lvl="1"/>
+            <a:r>
+              <a:rPr lang="da-DK" dirty="0"/>
+              <a:t>Støj</a:t>
+            </a:r>
+          </a:p>
+          <a:p>
+            <a:pPr lvl="1"/>
+            <a:r>
+              <a:rPr lang="da-DK" dirty="0"/>
+              <a:t>Ledninger</a:t>
+            </a:r>
           </a:p>
           <a:p>
             <a:endParaRPr lang="da-DK" dirty="0"/>
@@ -4310,9 +4530,10 @@
           <a:lstStyle/>
           <a:p>
             <a:r>
-              <a:rPr lang="da-DK" dirty="0"/>
-              <a:t>29. april 2018</a:t>
-            </a:r>
+              <a:rPr lang="da-DK"/>
+              <a:t>8. maj 2018</a:t>
+            </a:r>
+            <a:endParaRPr lang="da-DK" dirty="0"/>
           </a:p>
         </p:txBody>
       </p:sp>
@@ -5315,7 +5536,7 @@
           <a:p>
             <a:r>
               <a:rPr lang="da-DK"/>
-              <a:t>29. april 2018</a:t>
+              <a:t>8. maj 2018</a:t>
             </a:r>
             <a:endParaRPr lang="da-DK" dirty="0"/>
           </a:p>
@@ -5992,7 +6213,7 @@
           <a:p>
             <a:r>
               <a:rPr lang="da-DK"/>
-              <a:t>29. april 2018</a:t>
+              <a:t>8. maj 2018</a:t>
             </a:r>
             <a:endParaRPr lang="da-DK" dirty="0"/>
           </a:p>
@@ -6208,7 +6429,7 @@
           <a:p>
             <a:r>
               <a:rPr lang="da-DK"/>
-              <a:t>29. april 2018</a:t>
+              <a:t>8. maj 2018</a:t>
             </a:r>
             <a:endParaRPr lang="da-DK" dirty="0"/>
           </a:p>
@@ -6429,7 +6650,7 @@
           <a:p>
             <a:r>
               <a:rPr lang="da-DK"/>
-              <a:t>29. april 2018</a:t>
+              <a:t>8. maj 2018</a:t>
             </a:r>
             <a:endParaRPr lang="da-DK" dirty="0"/>
           </a:p>
@@ -6654,7 +6875,7 @@
           <a:p>
             <a:r>
               <a:rPr lang="da-DK"/>
-              <a:t>29. april 2018</a:t>
+              <a:t>8. maj 2018</a:t>
             </a:r>
             <a:endParaRPr lang="da-DK" dirty="0"/>
           </a:p>

</xml_diff>